<commit_message>
Updated the implementation of the stop-signal game in the introduction to labbench protocol
</commit_message>
<xml_diff>
--- a/intro.labbench/StopSignalGameImages.pptx
+++ b/intro.labbench/StopSignalGameImages.pptx
@@ -5,7 +5,7 @@
     <p:sldMasterId id="2147483648" r:id="rId1"/>
   </p:sldMasterIdLst>
   <p:notesMasterIdLst>
-    <p:notesMasterId r:id="rId10"/>
+    <p:notesMasterId r:id="rId9"/>
   </p:notesMasterIdLst>
   <p:sldIdLst>
     <p:sldId id="256" r:id="rId2"/>
@@ -14,8 +14,7 @@
     <p:sldId id="259" r:id="rId5"/>
     <p:sldId id="263" r:id="rId6"/>
     <p:sldId id="264" r:id="rId7"/>
-    <p:sldId id="266" r:id="rId8"/>
-    <p:sldId id="265" r:id="rId9"/>
+    <p:sldId id="265" r:id="rId8"/>
   </p:sldIdLst>
   <p:sldSz cx="12192000" cy="6858000"/>
   <p:notesSz cx="6858000" cy="9144000"/>
@@ -204,7 +203,7 @@
           <a:p>
             <a:fld id="{85D405C8-8E2E-43B7-A24E-734C11CAF91E}" type="datetimeFigureOut">
               <a:rPr lang="en-DK" smtClean="0"/>
-              <a:t>02/01/2025</a:t>
+              <a:t>25/03/2025</a:t>
             </a:fld>
             <a:endParaRPr lang="en-DK"/>
           </a:p>
@@ -1176,94 +1175,6 @@
           <a:bodyPr/>
           <a:lstStyle/>
           <a:p>
-            <a:r>
-              <a:rPr lang="en-GB" dirty="0"/>
-              <a:t>GameInstructions.png</a:t>
-            </a:r>
-            <a:endParaRPr lang="en-DK" dirty="0"/>
-          </a:p>
-        </p:txBody>
-      </p:sp>
-      <p:sp>
-        <p:nvSpPr>
-          <p:cNvPr id="4" name="Slide Number Placeholder 3"/>
-          <p:cNvSpPr>
-            <a:spLocks noGrp="1"/>
-          </p:cNvSpPr>
-          <p:nvPr>
-            <p:ph type="sldNum" sz="quarter" idx="5"/>
-          </p:nvPr>
-        </p:nvSpPr>
-        <p:spPr/>
-        <p:txBody>
-          <a:bodyPr/>
-          <a:lstStyle/>
-          <a:p>
-            <a:fld id="{18F6FCD6-91F5-47FE-A090-45B8ABDB6EF6}" type="slidenum">
-              <a:rPr lang="en-DK" smtClean="0"/>
-              <a:t>7</a:t>
-            </a:fld>
-            <a:endParaRPr lang="en-DK"/>
-          </a:p>
-        </p:txBody>
-      </p:sp>
-    </p:spTree>
-    <p:extLst>
-      <p:ext uri="{BB962C8B-B14F-4D97-AF65-F5344CB8AC3E}">
-        <p14:creationId xmlns:p14="http://schemas.microsoft.com/office/powerpoint/2010/main" val="2936752502"/>
-      </p:ext>
-    </p:extLst>
-  </p:cSld>
-  <p:clrMapOvr>
-    <a:masterClrMapping/>
-  </p:clrMapOvr>
-</p:notes>
-</file>
-
-<file path=ppt/notesSlides/notesSlide8.xml><?xml version="1.0" encoding="utf-8"?>
-<p:notes xmlns:a="http://schemas.openxmlformats.org/drawingml/2006/main" xmlns:r="http://schemas.openxmlformats.org/officeDocument/2006/relationships" xmlns:p="http://schemas.openxmlformats.org/presentationml/2006/main">
-  <p:cSld>
-    <p:spTree>
-      <p:nvGrpSpPr>
-        <p:cNvPr id="1" name=""/>
-        <p:cNvGrpSpPr/>
-        <p:nvPr/>
-      </p:nvGrpSpPr>
-      <p:grpSpPr>
-        <a:xfrm>
-          <a:off x="0" y="0"/>
-          <a:ext cx="0" cy="0"/>
-          <a:chOff x="0" y="0"/>
-          <a:chExt cx="0" cy="0"/>
-        </a:xfrm>
-      </p:grpSpPr>
-      <p:sp>
-        <p:nvSpPr>
-          <p:cNvPr id="2" name="Slide Image Placeholder 1"/>
-          <p:cNvSpPr>
-            <a:spLocks noGrp="1" noRot="1" noChangeAspect="1"/>
-          </p:cNvSpPr>
-          <p:nvPr>
-            <p:ph type="sldImg"/>
-          </p:nvPr>
-        </p:nvSpPr>
-        <p:spPr/>
-      </p:sp>
-      <p:sp>
-        <p:nvSpPr>
-          <p:cNvPr id="3" name="Notes Placeholder 2"/>
-          <p:cNvSpPr>
-            <a:spLocks noGrp="1"/>
-          </p:cNvSpPr>
-          <p:nvPr>
-            <p:ph type="body" idx="1"/>
-          </p:nvPr>
-        </p:nvSpPr>
-        <p:spPr/>
-        <p:txBody>
-          <a:bodyPr/>
-          <a:lstStyle/>
-          <a:p>
             <a:pPr marL="0" marR="0" lvl="0" indent="0" algn="l" defTabSz="914400" rtl="0" eaLnBrk="1" fontAlgn="auto" latinLnBrk="0" hangingPunct="1">
               <a:lnSpc>
                 <a:spcPct val="100000"/>
@@ -1311,7 +1222,7 @@
           <a:p>
             <a:fld id="{FFC4B7A3-226D-44E8-84CB-03CFFB6589DC}" type="slidenum">
               <a:rPr lang="en-DK" smtClean="0"/>
-              <a:t>8</a:t>
+              <a:t>7</a:t>
             </a:fld>
             <a:endParaRPr lang="en-DK"/>
           </a:p>
@@ -2256,7 +2167,7 @@
           <p:cNvPr id="3" name="TextBox 2">
             <a:extLst>
               <a:ext uri="{FF2B5EF4-FFF2-40B4-BE49-F238E27FC236}">
-                <a16:creationId xmlns:a16="http://schemas.microsoft.com/office/drawing/2014/main" id="{5C469FB7-C60C-248E-A62B-8B494AF60626}"/>
+                <a16:creationId xmlns:a16="http://schemas.microsoft.com/office/drawing/2014/main" id="{4EBFAB60-B43B-D5DB-D98A-B88B8E577AFE}"/>
               </a:ext>
             </a:extLst>
           </p:cNvPr>
@@ -2265,8 +2176,8 @@
         </p:nvSpPr>
         <p:spPr>
           <a:xfrm>
-            <a:off x="646761" y="286140"/>
-            <a:ext cx="10898477" cy="6299417"/>
+            <a:off x="537411" y="274108"/>
+            <a:ext cx="11117179" cy="6507294"/>
           </a:xfrm>
           <a:prstGeom prst="rect">
             <a:avLst/>
@@ -2281,63 +2192,8 @@
           <a:p>
             <a:pPr algn="ctr"/>
             <a:r>
-              <a:rPr lang="en-GB" sz="4800" b="1" dirty="0"/>
-              <a:t>Rules of the game</a:t>
-            </a:r>
-          </a:p>
-          <a:p>
-            <a:pPr marL="285750" indent="-285750">
-              <a:lnSpc>
-                <a:spcPct val="150000"/>
-              </a:lnSpc>
-              <a:buFont typeface="Arial" panose="020B0604020202020204" pitchFamily="34" charset="0"/>
-              <a:buChar char="•"/>
-            </a:pPr>
-            <a:r>
-              <a:rPr lang="en-GB" sz="3600" dirty="0"/>
-              <a:t>The objective of the game is to get as many points as possible.</a:t>
-            </a:r>
-          </a:p>
-          <a:p>
-            <a:pPr marL="285750" indent="-285750">
-              <a:lnSpc>
-                <a:spcPct val="150000"/>
-              </a:lnSpc>
-              <a:buFont typeface="Arial" panose="020B0604020202020204" pitchFamily="34" charset="0"/>
-              <a:buChar char="•"/>
-            </a:pPr>
-            <a:r>
-              <a:rPr lang="en-GB" sz="3600" dirty="0"/>
-              <a:t>In GO trials you get points if you answer correct. </a:t>
-            </a:r>
-            <a:r>
-              <a:rPr lang="en-GB" sz="3600" b="1" dirty="0"/>
-              <a:t>The faster you respond the more points you will get</a:t>
-            </a:r>
-            <a:r>
-              <a:rPr lang="en-GB" sz="3600" dirty="0"/>
-              <a:t>.</a:t>
-            </a:r>
-          </a:p>
-          <a:p>
-            <a:pPr marL="285750" indent="-285750">
-              <a:lnSpc>
-                <a:spcPct val="150000"/>
-              </a:lnSpc>
-              <a:buFont typeface="Arial" panose="020B0604020202020204" pitchFamily="34" charset="0"/>
-              <a:buChar char="•"/>
-            </a:pPr>
-            <a:r>
-              <a:rPr lang="en-GB" sz="3600" dirty="0"/>
-              <a:t>In STOP trials if you answer incorrectly, </a:t>
-            </a:r>
-            <a:r>
-              <a:rPr lang="en-GB" sz="3600" b="1" dirty="0"/>
-              <a:t>you will lose all points </a:t>
-            </a:r>
-            <a:r>
-              <a:rPr lang="en-GB" sz="3600" dirty="0"/>
-              <a:t>since the last STOP trial or the start of the game.</a:t>
+              <a:rPr lang="en-GB" sz="4000" b="1" dirty="0"/>
+              <a:t>Instructions</a:t>
             </a:r>
           </a:p>
           <a:p>
@@ -2346,76 +2202,21 @@
                 <a:spcPct val="110000"/>
               </a:lnSpc>
             </a:pPr>
-            <a:endParaRPr lang="en-GB" sz="3000" dirty="0"/>
-          </a:p>
-        </p:txBody>
-      </p:sp>
-    </p:spTree>
-    <p:extLst>
-      <p:ext uri="{BB962C8B-B14F-4D97-AF65-F5344CB8AC3E}">
-        <p14:creationId xmlns:p14="http://schemas.microsoft.com/office/powerpoint/2010/main" val="3266365140"/>
-      </p:ext>
-    </p:extLst>
-  </p:cSld>
-  <p:clrMapOvr>
-    <a:masterClrMapping/>
-  </p:clrMapOvr>
-</p:sld>
-</file>
-
-<file path=ppt/slides/slide8.xml><?xml version="1.0" encoding="utf-8"?>
-<p:sld xmlns:a="http://schemas.openxmlformats.org/drawingml/2006/main" xmlns:r="http://schemas.openxmlformats.org/officeDocument/2006/relationships" xmlns:p="http://schemas.openxmlformats.org/presentationml/2006/main">
-  <p:cSld>
-    <p:spTree>
-      <p:nvGrpSpPr>
-        <p:cNvPr id="1" name=""/>
-        <p:cNvGrpSpPr/>
-        <p:nvPr/>
-      </p:nvGrpSpPr>
-      <p:grpSpPr>
-        <a:xfrm>
-          <a:off x="0" y="0"/>
-          <a:ext cx="0" cy="0"/>
-          <a:chOff x="0" y="0"/>
-          <a:chExt cx="0" cy="0"/>
-        </a:xfrm>
-      </p:grpSpPr>
-      <p:sp>
-        <p:nvSpPr>
-          <p:cNvPr id="2" name="TextBox 1">
-            <a:extLst>
-              <a:ext uri="{FF2B5EF4-FFF2-40B4-BE49-F238E27FC236}">
-                <a16:creationId xmlns:a16="http://schemas.microsoft.com/office/drawing/2014/main" id="{AF388601-D0F5-FFE8-CB40-EB018A70D49F}"/>
-              </a:ext>
-            </a:extLst>
-          </p:cNvPr>
-          <p:cNvSpPr txBox="1"/>
-          <p:nvPr/>
-        </p:nvSpPr>
-        <p:spPr>
-          <a:xfrm>
-            <a:off x="646761" y="286140"/>
-            <a:ext cx="10898477" cy="5760808"/>
-          </a:xfrm>
-          <a:prstGeom prst="rect">
-            <a:avLst/>
-          </a:prstGeom>
-          <a:noFill/>
-        </p:spPr>
-        <p:txBody>
-          <a:bodyPr wrap="square" rtlCol="0">
-            <a:spAutoFit/>
-          </a:bodyPr>
-          <a:lstStyle/>
-          <a:p>
-            <a:pPr algn="ctr"/>
-            <a:r>
-              <a:rPr lang="en-GB" sz="4000" b="1" dirty="0"/>
-              <a:t>Instructions</a:t>
-            </a:r>
-          </a:p>
-          <a:p>
-            <a:pPr marL="285750" indent="-285750">
+            <a:r>
+              <a:rPr lang="en-GB" sz="3200" dirty="0"/>
+              <a:t>We would like you to play a game. In the game there will </a:t>
+            </a:r>
+            <a:r>
+              <a:rPr lang="en-GB" sz="3200" b="1" dirty="0"/>
+              <a:t>GO and STOP trials</a:t>
+            </a:r>
+            <a:r>
+              <a:rPr lang="en-GB" sz="3200" dirty="0"/>
+              <a:t>. Here are the rules of the game:</a:t>
+            </a:r>
+          </a:p>
+          <a:p>
+            <a:pPr marL="457200" indent="-457200">
               <a:lnSpc>
                 <a:spcPct val="110000"/>
               </a:lnSpc>
@@ -2423,12 +2224,28 @@
               <a:buChar char="•"/>
             </a:pPr>
             <a:r>
-              <a:rPr lang="en-GB" sz="3000" dirty="0"/>
-              <a:t>In this task, you must respond as quickly and accurately as possible to a left or right-pointing arrow. You respond by pressing the left or right keys of your pad. </a:t>
-            </a:r>
-          </a:p>
-          <a:p>
-            <a:pPr marL="285750" indent="-285750">
+              <a:rPr lang="en-GB" sz="2800" dirty="0"/>
+              <a:t>In </a:t>
+            </a:r>
+            <a:r>
+              <a:rPr lang="en-GB" sz="2800" b="1" dirty="0"/>
+              <a:t>GO trials </a:t>
+            </a:r>
+            <a:r>
+              <a:rPr lang="en-GB" sz="2800" dirty="0"/>
+              <a:t>you see a left or right-pointing arrow </a:t>
+            </a:r>
+            <a:r>
+              <a:rPr lang="en-GB" sz="2800" b="1" dirty="0"/>
+              <a:t>RESPOND </a:t>
+            </a:r>
+            <a:r>
+              <a:rPr lang="en-GB" sz="2800" dirty="0"/>
+              <a:t>by pressing the left or right keys of your pad.</a:t>
+            </a:r>
+          </a:p>
+          <a:p>
+            <a:pPr marL="457200" indent="-457200">
               <a:lnSpc>
                 <a:spcPct val="110000"/>
               </a:lnSpc>
@@ -2436,12 +2253,28 @@
               <a:buChar char="•"/>
             </a:pPr>
             <a:r>
-              <a:rPr lang="en-GB" sz="3000" dirty="0"/>
-              <a:t>You have only a short time to respond, so you must be ready for the task, which requires your full attention.</a:t>
-            </a:r>
-          </a:p>
-          <a:p>
-            <a:pPr marL="285750" indent="-285750">
+              <a:rPr lang="en-GB" sz="2800" dirty="0"/>
+              <a:t>In </a:t>
+            </a:r>
+            <a:r>
+              <a:rPr lang="en-GB" sz="2800" b="1" dirty="0"/>
+              <a:t>STOP trials</a:t>
+            </a:r>
+            <a:r>
+              <a:rPr lang="en-GB" sz="2800" dirty="0"/>
+              <a:t>, you see an arrow followed by a RED CIRCLE. In these trials </a:t>
+            </a:r>
+            <a:r>
+              <a:rPr lang="en-GB" sz="2800" b="1" dirty="0"/>
+              <a:t>DO NOT RESPOND</a:t>
+            </a:r>
+            <a:r>
+              <a:rPr lang="en-GB" sz="2800" dirty="0"/>
+              <a:t>!</a:t>
+            </a:r>
+          </a:p>
+          <a:p>
+            <a:pPr marL="457200" indent="-457200">
               <a:lnSpc>
                 <a:spcPct val="110000"/>
               </a:lnSpc>
@@ -2449,12 +2282,12 @@
               <a:buChar char="•"/>
             </a:pPr>
             <a:r>
-              <a:rPr lang="en-GB" sz="3000" dirty="0"/>
-              <a:t>However, if you see a RED CIRCLE, you should NOT RESPOND!</a:t>
-            </a:r>
-          </a:p>
-          <a:p>
-            <a:pPr marL="285750" indent="-285750">
+              <a:rPr lang="en-GB" sz="2800" dirty="0"/>
+              <a:t>The objective of the game is to get as many points as possible.</a:t>
+            </a:r>
+          </a:p>
+          <a:p>
+            <a:pPr marL="457200" indent="-457200">
               <a:lnSpc>
                 <a:spcPct val="110000"/>
               </a:lnSpc>
@@ -2462,8 +2295,41 @@
               <a:buChar char="•"/>
             </a:pPr>
             <a:r>
-              <a:rPr lang="en-GB" sz="3000" dirty="0"/>
-              <a:t>It seems easy, but it is actually very difficult. Additionally, the computer will adjust the task speed based on your performance during the task; this means that sometimes, it will be difficult for you not to respond. </a:t>
+              <a:rPr lang="en-GB" sz="2800" dirty="0"/>
+              <a:t>In GO trials you will get temporary points if you answer correct. </a:t>
+            </a:r>
+            <a:r>
+              <a:rPr lang="en-GB" sz="2800" b="1" dirty="0"/>
+              <a:t>The faster you respond the more points you will get.</a:t>
+            </a:r>
+          </a:p>
+          <a:p>
+            <a:pPr marL="457200" indent="-457200">
+              <a:lnSpc>
+                <a:spcPct val="110000"/>
+              </a:lnSpc>
+              <a:buFont typeface="Arial" panose="020B0604020202020204" pitchFamily="34" charset="0"/>
+              <a:buChar char="•"/>
+            </a:pPr>
+            <a:r>
+              <a:rPr lang="en-GB" sz="2800" dirty="0"/>
+              <a:t>In STOP trials if you </a:t>
+            </a:r>
+            <a:r>
+              <a:rPr lang="en-GB" sz="2800" b="1" dirty="0"/>
+              <a:t>DO NOT RESPOND </a:t>
+            </a:r>
+            <a:r>
+              <a:rPr lang="en-GB" sz="2800" dirty="0"/>
+              <a:t>you earn the temporary points from the GO trials. However, </a:t>
+            </a:r>
+            <a:r>
+              <a:rPr lang="en-GB" sz="2800" b="1" dirty="0"/>
+              <a:t>if you RESPOND, you will lose the temporary points</a:t>
+            </a:r>
+            <a:r>
+              <a:rPr lang="en-GB" sz="2800" dirty="0"/>
+              <a:t>.</a:t>
             </a:r>
           </a:p>
         </p:txBody>

</xml_diff>

<commit_message>
Bugfixes to the introduction to LabBench
</commit_message>
<xml_diff>
--- a/intro.labbench/StopSignalGameImages.pptx
+++ b/intro.labbench/StopSignalGameImages.pptx
@@ -203,7 +203,7 @@
           <a:p>
             <a:fld id="{85D405C8-8E2E-43B7-A24E-734C11CAF91E}" type="datetimeFigureOut">
               <a:rPr lang="en-DK" smtClean="0"/>
-              <a:t>25/03/2025</a:t>
+              <a:t>02/02/2026</a:t>
             </a:fld>
             <a:endParaRPr lang="en-DK"/>
           </a:p>
@@ -2283,7 +2283,15 @@
             </a:pPr>
             <a:r>
               <a:rPr lang="en-GB" sz="2800" dirty="0"/>
-              <a:t>The objective of the game is to get as many points as possible.</a:t>
+              <a:t>The objective of the game is to g</a:t>
+            </a:r>
+            <a:r>
+              <a:rPr lang="en-GB" sz="2800" b="1" dirty="0"/>
+              <a:t>et as many points as possible</a:t>
+            </a:r>
+            <a:r>
+              <a:rPr lang="en-GB" sz="2800" dirty="0"/>
+              <a:t>.</a:t>
             </a:r>
           </a:p>
           <a:p>
@@ -2321,15 +2329,15 @@
             </a:r>
             <a:r>
               <a:rPr lang="en-GB" sz="2800" dirty="0"/>
-              <a:t>you earn the temporary points from the GO trials. However, </a:t>
+              <a:t>you earn the temporary points from the GO trials. However, if you </a:t>
             </a:r>
             <a:r>
               <a:rPr lang="en-GB" sz="2800" b="1" dirty="0"/>
-              <a:t>if you RESPOND, you will lose the temporary points</a:t>
+              <a:t>RESPOND</a:t>
             </a:r>
             <a:r>
               <a:rPr lang="en-GB" sz="2800" dirty="0"/>
-              <a:t>.</a:t>
+              <a:t>, you will lose the temporary points.</a:t>
             </a:r>
           </a:p>
         </p:txBody>

</xml_diff>